<commit_message>
add more text and add 'import' into homecontroller
</commit_message>
<xml_diff>
--- a/TypeScript.pptx
+++ b/TypeScript.pptx
@@ -214,7 +214,7 @@
           <a:p>
             <a:fld id="{30CB97A1-5740-48C4-BBB8-C5D8F94E005F}" type="datetimeFigureOut">
               <a:rPr lang="en-US" smtClean="0"/>
-              <a:t>2/20/2016</a:t>
+              <a:t>2/24/2016</a:t>
             </a:fld>
             <a:endParaRPr lang="en-US"/>
           </a:p>
@@ -889,6 +889,147 @@
 </p:notes>
 </file>
 
+<file path=ppt/notesSlides/notesSlide2.xml><?xml version="1.0" encoding="utf-8"?>
+<p:notes xmlns:a="http://schemas.openxmlformats.org/drawingml/2006/main" xmlns:r="http://schemas.openxmlformats.org/officeDocument/2006/relationships" xmlns:p="http://schemas.openxmlformats.org/presentationml/2006/main">
+  <p:cSld>
+    <p:spTree>
+      <p:nvGrpSpPr>
+        <p:cNvPr id="1" name=""/>
+        <p:cNvGrpSpPr/>
+        <p:nvPr/>
+      </p:nvGrpSpPr>
+      <p:grpSpPr>
+        <a:xfrm>
+          <a:off x="0" y="0"/>
+          <a:ext cx="0" cy="0"/>
+          <a:chOff x="0" y="0"/>
+          <a:chExt cx="0" cy="0"/>
+        </a:xfrm>
+      </p:grpSpPr>
+      <p:sp>
+        <p:nvSpPr>
+          <p:cNvPr id="2" name="Slide Image Placeholder 1"/>
+          <p:cNvSpPr>
+            <a:spLocks noGrp="1" noRot="1" noChangeAspect="1"/>
+          </p:cNvSpPr>
+          <p:nvPr>
+            <p:ph type="sldImg"/>
+          </p:nvPr>
+        </p:nvSpPr>
+        <p:spPr/>
+      </p:sp>
+      <p:sp>
+        <p:nvSpPr>
+          <p:cNvPr id="3" name="Notes Placeholder 2"/>
+          <p:cNvSpPr>
+            <a:spLocks noGrp="1"/>
+          </p:cNvSpPr>
+          <p:nvPr>
+            <p:ph type="body" idx="1"/>
+          </p:nvPr>
+        </p:nvSpPr>
+        <p:spPr/>
+        <p:txBody>
+          <a:bodyPr/>
+          <a:lstStyle/>
+          <a:p>
+            <a:r>
+              <a:rPr lang="en-US" baseline="0" dirty="0" smtClean="0"/>
+              <a:t>by theory, you never write native </a:t>
+            </a:r>
+            <a:r>
+              <a:rPr lang="en-US" baseline="0" dirty="0" err="1" smtClean="0"/>
+              <a:t>javascripts</a:t>
+            </a:r>
+            <a:r>
+              <a:rPr lang="en-US" baseline="0" dirty="0" smtClean="0"/>
+              <a:t> anymore, you just write </a:t>
+            </a:r>
+            <a:r>
+              <a:rPr lang="en-US" baseline="0" dirty="0" err="1" smtClean="0"/>
+              <a:t>ts</a:t>
+            </a:r>
+            <a:r>
+              <a:rPr lang="en-US" baseline="0" dirty="0" smtClean="0"/>
+              <a:t>. </a:t>
+            </a:r>
+            <a:r>
+              <a:rPr lang="en-US" dirty="0" smtClean="0"/>
+              <a:t>Because</a:t>
+            </a:r>
+            <a:r>
+              <a:rPr lang="en-US" baseline="0" dirty="0" smtClean="0"/>
+              <a:t> </a:t>
+            </a:r>
+            <a:r>
+              <a:rPr lang="en-US" baseline="0" dirty="0" err="1" smtClean="0"/>
+              <a:t>ts</a:t>
+            </a:r>
+            <a:r>
+              <a:rPr lang="en-US" baseline="0" dirty="0" smtClean="0"/>
+              <a:t> has so many benefits (such as type safety, module, object oriented, so it is really good for large scale application development,, and it is complied to </a:t>
+            </a:r>
+            <a:r>
+              <a:rPr lang="en-US" baseline="0" dirty="0" err="1" smtClean="0"/>
+              <a:t>javascript</a:t>
+            </a:r>
+            <a:r>
+              <a:rPr lang="en-US" baseline="0" dirty="0" smtClean="0"/>
+              <a:t>. For example, the heritage, and select committee we developed before, they were really complex projects, angular code was written with </a:t>
+            </a:r>
+            <a:r>
+              <a:rPr lang="en-US" baseline="0" dirty="0" err="1" smtClean="0"/>
+              <a:t>javascript</a:t>
+            </a:r>
+            <a:r>
+              <a:rPr lang="en-US" baseline="0" dirty="0" smtClean="0"/>
+              <a:t>, a lots redundant variables and functions, and it is really hard to maintain by other developers, even myself, sometimes hard to follow my own code, which was written few days ago.</a:t>
+            </a:r>
+          </a:p>
+          <a:p>
+            <a:endParaRPr lang="en-US" baseline="0" dirty="0" smtClean="0"/>
+          </a:p>
+          <a:p>
+            <a:endParaRPr lang="en-US" dirty="0"/>
+          </a:p>
+        </p:txBody>
+      </p:sp>
+      <p:sp>
+        <p:nvSpPr>
+          <p:cNvPr id="4" name="Slide Number Placeholder 3"/>
+          <p:cNvSpPr>
+            <a:spLocks noGrp="1"/>
+          </p:cNvSpPr>
+          <p:nvPr>
+            <p:ph type="sldNum" sz="quarter" idx="10"/>
+          </p:nvPr>
+        </p:nvSpPr>
+        <p:spPr/>
+        <p:txBody>
+          <a:bodyPr/>
+          <a:lstStyle/>
+          <a:p>
+            <a:fld id="{414A9C24-F0E8-4D37-BCBE-75261BA7258A}" type="slidenum">
+              <a:rPr lang="en-US" smtClean="0"/>
+              <a:t>6</a:t>
+            </a:fld>
+            <a:endParaRPr lang="en-US"/>
+          </a:p>
+        </p:txBody>
+      </p:sp>
+    </p:spTree>
+    <p:extLst>
+      <p:ext uri="{BB962C8B-B14F-4D97-AF65-F5344CB8AC3E}">
+        <p14:creationId xmlns:p14="http://schemas.microsoft.com/office/powerpoint/2010/main" val="764798588"/>
+      </p:ext>
+    </p:extLst>
+  </p:cSld>
+  <p:clrMapOvr>
+    <a:masterClrMapping/>
+  </p:clrMapOvr>
+</p:notes>
+</file>
+
 <file path=ppt/slideLayouts/slideLayout1.xml><?xml version="1.0" encoding="utf-8"?>
 <p:sldLayout xmlns:a="http://schemas.openxmlformats.org/drawingml/2006/main" xmlns:r="http://schemas.openxmlformats.org/officeDocument/2006/relationships" xmlns:p="http://schemas.openxmlformats.org/presentationml/2006/main" type="title" preserve="1">
   <p:cSld name="Title Slide">
@@ -1078,7 +1219,7 @@
             <a:fld id="{B61BEF0D-F0BB-DE4B-95CE-6DB70DBA9567}" type="datetimeFigureOut">
               <a:rPr lang="en-US" dirty="0"/>
               <a:pPr/>
-              <a:t>2/20/2016</a:t>
+              <a:t>2/24/2016</a:t>
             </a:fld>
             <a:endParaRPr lang="en-US" dirty="0"/>
           </a:p>
@@ -1413,7 +1554,7 @@
             <a:fld id="{B61BEF0D-F0BB-DE4B-95CE-6DB70DBA9567}" type="datetimeFigureOut">
               <a:rPr lang="en-US" dirty="0"/>
               <a:pPr/>
-              <a:t>2/20/2016</a:t>
+              <a:t>2/24/2016</a:t>
             </a:fld>
             <a:endParaRPr lang="en-US" dirty="0"/>
           </a:p>
@@ -1811,7 +1952,7 @@
             <a:fld id="{B61BEF0D-F0BB-DE4B-95CE-6DB70DBA9567}" type="datetimeFigureOut">
               <a:rPr lang="en-US" dirty="0"/>
               <a:pPr/>
-              <a:t>2/20/2016</a:t>
+              <a:t>2/24/2016</a:t>
             </a:fld>
             <a:endParaRPr lang="en-US" dirty="0"/>
           </a:p>
@@ -2143,7 +2284,7 @@
             <a:fld id="{B61BEF0D-F0BB-DE4B-95CE-6DB70DBA9567}" type="datetimeFigureOut">
               <a:rPr lang="en-US" dirty="0"/>
               <a:pPr/>
-              <a:t>2/20/2016</a:t>
+              <a:t>2/24/2016</a:t>
             </a:fld>
             <a:endParaRPr lang="en-US" dirty="0"/>
           </a:p>
@@ -2460,7 +2601,7 @@
             <a:fld id="{B61BEF0D-F0BB-DE4B-95CE-6DB70DBA9567}" type="datetimeFigureOut">
               <a:rPr lang="en-US" dirty="0"/>
               <a:pPr/>
-              <a:t>2/20/2016</a:t>
+              <a:t>2/24/2016</a:t>
             </a:fld>
             <a:endParaRPr lang="en-US" dirty="0"/>
           </a:p>
@@ -2853,7 +2994,7 @@
             <a:fld id="{B61BEF0D-F0BB-DE4B-95CE-6DB70DBA9567}" type="datetimeFigureOut">
               <a:rPr lang="en-US" dirty="0"/>
               <a:pPr/>
-              <a:t>2/20/2016</a:t>
+              <a:t>2/24/2016</a:t>
             </a:fld>
             <a:endParaRPr lang="en-US" dirty="0"/>
           </a:p>
@@ -3107,7 +3248,7 @@
             <a:fld id="{B61BEF0D-F0BB-DE4B-95CE-6DB70DBA9567}" type="datetimeFigureOut">
               <a:rPr lang="en-US" dirty="0"/>
               <a:pPr/>
-              <a:t>2/20/2016</a:t>
+              <a:t>2/24/2016</a:t>
             </a:fld>
             <a:endParaRPr lang="en-US" dirty="0"/>
           </a:p>
@@ -3366,7 +3507,7 @@
             <a:fld id="{B61BEF0D-F0BB-DE4B-95CE-6DB70DBA9567}" type="datetimeFigureOut">
               <a:rPr lang="en-US" dirty="0"/>
               <a:pPr/>
-              <a:t>2/20/2016</a:t>
+              <a:t>2/24/2016</a:t>
             </a:fld>
             <a:endParaRPr lang="en-US" dirty="0"/>
           </a:p>
@@ -3625,7 +3766,7 @@
             <a:fld id="{B61BEF0D-F0BB-DE4B-95CE-6DB70DBA9567}" type="datetimeFigureOut">
               <a:rPr lang="en-US" dirty="0"/>
               <a:pPr/>
-              <a:t>2/20/2016</a:t>
+              <a:t>2/24/2016</a:t>
             </a:fld>
             <a:endParaRPr lang="en-US" dirty="0"/>
           </a:p>
@@ -3951,7 +4092,7 @@
             <a:fld id="{B61BEF0D-F0BB-DE4B-95CE-6DB70DBA9567}" type="datetimeFigureOut">
               <a:rPr lang="en-US" dirty="0"/>
               <a:pPr/>
-              <a:t>2/20/2016</a:t>
+              <a:t>2/24/2016</a:t>
             </a:fld>
             <a:endParaRPr lang="en-US" dirty="0"/>
           </a:p>
@@ -4271,7 +4412,7 @@
             <a:fld id="{B61BEF0D-F0BB-DE4B-95CE-6DB70DBA9567}" type="datetimeFigureOut">
               <a:rPr lang="en-US" dirty="0"/>
               <a:pPr/>
-              <a:t>2/20/2016</a:t>
+              <a:t>2/24/2016</a:t>
             </a:fld>
             <a:endParaRPr lang="en-US" dirty="0"/>
           </a:p>
@@ -4725,7 +4866,7 @@
             <a:fld id="{B61BEF0D-F0BB-DE4B-95CE-6DB70DBA9567}" type="datetimeFigureOut">
               <a:rPr lang="en-US" dirty="0"/>
               <a:pPr/>
-              <a:t>2/20/2016</a:t>
+              <a:t>2/24/2016</a:t>
             </a:fld>
             <a:endParaRPr lang="en-US" dirty="0"/>
           </a:p>
@@ -4927,7 +5068,7 @@
             <a:fld id="{B61BEF0D-F0BB-DE4B-95CE-6DB70DBA9567}" type="datetimeFigureOut">
               <a:rPr lang="en-US" dirty="0"/>
               <a:pPr/>
-              <a:t>2/20/2016</a:t>
+              <a:t>2/24/2016</a:t>
             </a:fld>
             <a:endParaRPr lang="en-US" dirty="0"/>
           </a:p>
@@ -5101,7 +5242,7 @@
             <a:fld id="{B61BEF0D-F0BB-DE4B-95CE-6DB70DBA9567}" type="datetimeFigureOut">
               <a:rPr lang="en-US" dirty="0"/>
               <a:pPr/>
-              <a:t>2/20/2016</a:t>
+              <a:t>2/24/2016</a:t>
             </a:fld>
             <a:endParaRPr lang="en-US" dirty="0"/>
           </a:p>
@@ -5431,7 +5572,7 @@
             <a:fld id="{B61BEF0D-F0BB-DE4B-95CE-6DB70DBA9567}" type="datetimeFigureOut">
               <a:rPr lang="en-US" dirty="0"/>
               <a:pPr/>
-              <a:t>2/20/2016</a:t>
+              <a:t>2/24/2016</a:t>
             </a:fld>
             <a:endParaRPr lang="en-US" dirty="0"/>
           </a:p>
@@ -5773,7 +5914,7 @@
             <a:fld id="{B61BEF0D-F0BB-DE4B-95CE-6DB70DBA9567}" type="datetimeFigureOut">
               <a:rPr lang="en-US" dirty="0"/>
               <a:pPr/>
-              <a:t>2/20/2016</a:t>
+              <a:t>2/24/2016</a:t>
             </a:fld>
             <a:endParaRPr lang="en-US" dirty="0"/>
           </a:p>
@@ -7887,7 +8028,7 @@
             <a:fld id="{B61BEF0D-F0BB-DE4B-95CE-6DB70DBA9567}" type="datetimeFigureOut">
               <a:rPr lang="en-US" dirty="0"/>
               <a:pPr/>
-              <a:t>2/20/2016</a:t>
+              <a:t>2/24/2016</a:t>
             </a:fld>
             <a:endParaRPr lang="en-US" dirty="0"/>
           </a:p>
@@ -8900,7 +9041,6 @@
               <a:rPr lang="en-NZ" dirty="0" smtClean="0"/>
               <a:t>Classes (parent, child, abstract)</a:t>
             </a:r>
-            <a:endParaRPr lang="en-NZ" dirty="0" smtClean="0"/>
           </a:p>
           <a:p>
             <a:r>
@@ -9068,10 +9208,9 @@
               <a:t>vue</a:t>
             </a:r>
             <a:r>
-              <a:rPr lang="en-US" smtClean="0"/>
+              <a:rPr lang="en-US" dirty="0" smtClean="0"/>
               <a:t>, backbones)</a:t>
             </a:r>
-            <a:endParaRPr lang="en-US" dirty="0" smtClean="0"/>
           </a:p>
         </p:txBody>
       </p:sp>

</xml_diff>